<commit_message>
adding tips and FAQs document
adding tips and FAQs first draft for ACRM
</commit_message>
<xml_diff>
--- a/lohse ACRM 2017 workshop.pptx
+++ b/lohse ACRM 2017 workshop.pptx
@@ -225,7 +225,7 @@
           <a:p>
             <a:fld id="{884C76E6-7EF3-400B-BE3B-453705C25BC3}" type="datetimeFigureOut">
               <a:rPr lang="en-US" smtClean="0"/>
-              <a:t>4/26/2017</a:t>
+              <a:t>10/23/2017</a:t>
             </a:fld>
             <a:endParaRPr lang="en-US"/>
           </a:p>
@@ -624,7 +624,7 @@
           <a:p>
             <a:fld id="{4A466088-243E-44D6-A408-1775B5BA8DD6}" type="datetime1">
               <a:rPr lang="en-US" smtClean="0"/>
-              <a:t>4/26/2017</a:t>
+              <a:t>10/23/2017</a:t>
             </a:fld>
             <a:endParaRPr lang="en-US"/>
           </a:p>
@@ -794,7 +794,7 @@
           <a:p>
             <a:fld id="{DA0AA6BE-50D6-4BA0-AD77-277B2FCBD3AE}" type="datetime1">
               <a:rPr lang="en-US" smtClean="0"/>
-              <a:t>4/26/2017</a:t>
+              <a:t>10/23/2017</a:t>
             </a:fld>
             <a:endParaRPr lang="en-US"/>
           </a:p>
@@ -974,7 +974,7 @@
           <a:p>
             <a:fld id="{2F53AEE6-7037-44AB-84C6-92157B5622B7}" type="datetime1">
               <a:rPr lang="en-US" smtClean="0"/>
-              <a:t>4/26/2017</a:t>
+              <a:t>10/23/2017</a:t>
             </a:fld>
             <a:endParaRPr lang="en-US"/>
           </a:p>
@@ -1144,7 +1144,7 @@
           <a:p>
             <a:fld id="{C12F8C26-0747-4C32-B8F2-78CDB4AF9A68}" type="datetime1">
               <a:rPr lang="en-US" smtClean="0"/>
-              <a:t>4/26/2017</a:t>
+              <a:t>10/23/2017</a:t>
             </a:fld>
             <a:endParaRPr lang="en-US"/>
           </a:p>
@@ -1397,7 +1397,7 @@
           <a:p>
             <a:fld id="{4BC38E00-18B7-4F88-8122-C6E5CE5D966F}" type="datetime1">
               <a:rPr lang="en-US" smtClean="0"/>
-              <a:t>4/26/2017</a:t>
+              <a:t>10/23/2017</a:t>
             </a:fld>
             <a:endParaRPr lang="en-US"/>
           </a:p>
@@ -1629,7 +1629,7 @@
           <a:p>
             <a:fld id="{A5E101D0-F977-4BAD-9E53-681A58BE0FC6}" type="datetime1">
               <a:rPr lang="en-US" smtClean="0"/>
-              <a:t>4/26/2017</a:t>
+              <a:t>10/23/2017</a:t>
             </a:fld>
             <a:endParaRPr lang="en-US"/>
           </a:p>
@@ -1996,7 +1996,7 @@
           <a:p>
             <a:fld id="{25FC29B6-2F2F-44FC-A417-BAE191C1072F}" type="datetime1">
               <a:rPr lang="en-US" smtClean="0"/>
-              <a:t>4/26/2017</a:t>
+              <a:t>10/23/2017</a:t>
             </a:fld>
             <a:endParaRPr lang="en-US"/>
           </a:p>
@@ -2114,7 +2114,7 @@
           <a:p>
             <a:fld id="{A2EEFC4B-AA0C-4282-9B71-4BFFED71C00D}" type="datetime1">
               <a:rPr lang="en-US" smtClean="0"/>
-              <a:t>4/26/2017</a:t>
+              <a:t>10/23/2017</a:t>
             </a:fld>
             <a:endParaRPr lang="en-US"/>
           </a:p>
@@ -2209,7 +2209,7 @@
           <a:p>
             <a:fld id="{F55316B0-5752-4BA0-8DB9-51B1D3027AE5}" type="datetime1">
               <a:rPr lang="en-US" smtClean="0"/>
-              <a:t>4/26/2017</a:t>
+              <a:t>10/23/2017</a:t>
             </a:fld>
             <a:endParaRPr lang="en-US"/>
           </a:p>
@@ -2486,7 +2486,7 @@
           <a:p>
             <a:fld id="{ACE72FBB-8519-4FAA-BD37-EA5EB0253600}" type="datetime1">
               <a:rPr lang="en-US" smtClean="0"/>
-              <a:t>4/26/2017</a:t>
+              <a:t>10/23/2017</a:t>
             </a:fld>
             <a:endParaRPr lang="en-US"/>
           </a:p>
@@ -2739,7 +2739,7 @@
           <a:p>
             <a:fld id="{48FB54DE-4695-452B-AA3A-606BA6BD93FB}" type="datetime1">
               <a:rPr lang="en-US" smtClean="0"/>
-              <a:t>4/26/2017</a:t>
+              <a:t>10/23/2017</a:t>
             </a:fld>
             <a:endParaRPr lang="en-US"/>
           </a:p>
@@ -2952,7 +2952,7 @@
           <a:p>
             <a:fld id="{77D4EBB2-E6B3-4741-8C58-9501D65C1B0D}" type="datetime1">
               <a:rPr lang="en-US" smtClean="0"/>
-              <a:t>4/26/2017</a:t>
+              <a:t>10/23/2017</a:t>
             </a:fld>
             <a:endParaRPr lang="en-US"/>
           </a:p>
@@ -3413,7 +3413,7 @@
         </p:spPr>
         <p:txBody>
           <a:bodyPr>
-            <a:normAutofit/>
+            <a:normAutofit fontScale="92500" lnSpcReduction="20000"/>
           </a:bodyPr>
           <a:lstStyle/>
           <a:p>
@@ -3446,8 +3446,40 @@
                   </a:schemeClr>
                 </a:solidFill>
               </a:rPr>
-              <a:t>Department of Physical Therapy and Athletic Training</a:t>
-            </a:r>
+              <a:t>Department of Physical Therapy and Athletic </a:t>
+            </a:r>
+            <a:r>
+              <a:rPr lang="en-US" sz="2000" dirty="0" smtClean="0">
+                <a:solidFill>
+                  <a:schemeClr val="tx1">
+                    <a:lumMod val="50000"/>
+                    <a:lumOff val="50000"/>
+                  </a:schemeClr>
+                </a:solidFill>
+              </a:rPr>
+              <a:t>Training</a:t>
+            </a:r>
+          </a:p>
+          <a:p>
+            <a:r>
+              <a:rPr lang="en-US" sz="2000" dirty="0" smtClean="0">
+                <a:solidFill>
+                  <a:schemeClr val="tx1">
+                    <a:lumMod val="50000"/>
+                    <a:lumOff val="50000"/>
+                  </a:schemeClr>
+                </a:solidFill>
+              </a:rPr>
+              <a:t>University of Utah</a:t>
+            </a:r>
+            <a:endParaRPr lang="en-US" sz="2000" dirty="0" smtClean="0">
+              <a:solidFill>
+                <a:schemeClr val="tx1">
+                  <a:lumMod val="50000"/>
+                  <a:lumOff val="50000"/>
+                </a:schemeClr>
+              </a:solidFill>
+            </a:endParaRPr>
           </a:p>
         </p:txBody>
       </p:sp>
@@ -5395,8 +5427,8 @@
           </a:p>
         </p:txBody>
       </p:sp>
-      <mc:AlternateContent xmlns:mc="http://schemas.openxmlformats.org/markup-compatibility/2006">
-        <mc:Choice xmlns:a14="http://schemas.microsoft.com/office/drawing/2010/main" Requires="a14">
+      <mc:AlternateContent xmlns:mc="http://schemas.openxmlformats.org/markup-compatibility/2006" xmlns:a14="http://schemas.microsoft.com/office/drawing/2010/main">
+        <mc:Choice Requires="a14">
           <p:sp>
             <p:nvSpPr>
               <p:cNvPr id="4" name="TextBox 3"/>
@@ -5710,7 +5742,7 @@
             </p:txBody>
           </p:sp>
         </mc:Choice>
-        <mc:Fallback>
+        <mc:Fallback xmlns="">
           <p:sp>
             <p:nvSpPr>
               <p:cNvPr id="4" name="TextBox 3"/>
@@ -7135,8 +7167,8 @@
           </a:p>
         </p:txBody>
       </p:sp>
-      <mc:AlternateContent xmlns:mc="http://schemas.openxmlformats.org/markup-compatibility/2006">
-        <mc:Choice xmlns:a14="http://schemas.microsoft.com/office/drawing/2010/main" Requires="a14">
+      <mc:AlternateContent xmlns:mc="http://schemas.openxmlformats.org/markup-compatibility/2006" xmlns:a14="http://schemas.microsoft.com/office/drawing/2010/main">
+        <mc:Choice Requires="a14">
           <p:sp>
             <p:nvSpPr>
               <p:cNvPr id="28" name="TextBox 27"/>
@@ -7283,7 +7315,7 @@
             </p:txBody>
           </p:sp>
         </mc:Choice>
-        <mc:Fallback>
+        <mc:Fallback xmlns="">
           <p:sp>
             <p:nvSpPr>
               <p:cNvPr id="28" name="TextBox 27"/>
@@ -7352,8 +7384,8 @@
           </a:p>
         </p:txBody>
       </p:sp>
-      <mc:AlternateContent xmlns:mc="http://schemas.openxmlformats.org/markup-compatibility/2006">
-        <mc:Choice xmlns:a14="http://schemas.microsoft.com/office/drawing/2010/main" Requires="a14">
+      <mc:AlternateContent xmlns:mc="http://schemas.openxmlformats.org/markup-compatibility/2006" xmlns:a14="http://schemas.microsoft.com/office/drawing/2010/main">
+        <mc:Choice Requires="a14">
           <p:sp>
             <p:nvSpPr>
               <p:cNvPr id="30" name="TextBox 29"/>
@@ -7500,7 +7532,7 @@
             </p:txBody>
           </p:sp>
         </mc:Choice>
-        <mc:Fallback>
+        <mc:Fallback xmlns="">
           <p:sp>
             <p:nvSpPr>
               <p:cNvPr id="30" name="TextBox 29"/>
@@ -9295,8 +9327,8 @@
           </a:p>
         </p:txBody>
       </p:sp>
-      <mc:AlternateContent xmlns:mc="http://schemas.openxmlformats.org/markup-compatibility/2006">
-        <mc:Choice xmlns:a14="http://schemas.microsoft.com/office/drawing/2010/main" Requires="a14">
+      <mc:AlternateContent xmlns:mc="http://schemas.openxmlformats.org/markup-compatibility/2006" xmlns:a14="http://schemas.microsoft.com/office/drawing/2010/main">
+        <mc:Choice Requires="a14">
           <p:sp>
             <p:nvSpPr>
               <p:cNvPr id="60" name="TextBox 59"/>
@@ -9512,7 +9544,7 @@
             </p:txBody>
           </p:sp>
         </mc:Choice>
-        <mc:Fallback>
+        <mc:Fallback xmlns="">
           <p:sp>
             <p:nvSpPr>
               <p:cNvPr id="60" name="TextBox 59"/>
@@ -9581,8 +9613,8 @@
           </a:p>
         </p:txBody>
       </p:sp>
-      <mc:AlternateContent xmlns:mc="http://schemas.openxmlformats.org/markup-compatibility/2006">
-        <mc:Choice xmlns:a14="http://schemas.microsoft.com/office/drawing/2010/main" Requires="a14">
+      <mc:AlternateContent xmlns:mc="http://schemas.openxmlformats.org/markup-compatibility/2006" xmlns:a14="http://schemas.microsoft.com/office/drawing/2010/main">
+        <mc:Choice Requires="a14">
           <p:sp>
             <p:nvSpPr>
               <p:cNvPr id="62" name="TextBox 61"/>
@@ -9798,7 +9830,7 @@
             </p:txBody>
           </p:sp>
         </mc:Choice>
-        <mc:Fallback>
+        <mc:Fallback xmlns="">
           <p:sp>
             <p:nvSpPr>
               <p:cNvPr id="62" name="TextBox 61"/>
@@ -11984,8 +12016,8 @@
           </a:fontRef>
         </p:style>
       </p:cxnSp>
-      <mc:AlternateContent xmlns:mc="http://schemas.openxmlformats.org/markup-compatibility/2006">
-        <mc:Choice xmlns:a14="http://schemas.microsoft.com/office/drawing/2010/main" Requires="a14">
+      <mc:AlternateContent xmlns:mc="http://schemas.openxmlformats.org/markup-compatibility/2006" xmlns:a14="http://schemas.microsoft.com/office/drawing/2010/main">
+        <mc:Choice Requires="a14">
           <p:sp>
             <p:nvSpPr>
               <p:cNvPr id="33" name="TextBox 32"/>
@@ -12120,7 +12152,7 @@
             </p:txBody>
           </p:sp>
         </mc:Choice>
-        <mc:Fallback>
+        <mc:Fallback xmlns="">
           <p:sp>
             <p:nvSpPr>
               <p:cNvPr id="33" name="TextBox 32"/>
@@ -12183,18 +12215,14 @@
           <a:p>
             <a:r>
               <a:rPr lang="en-US" u="sng" dirty="0" smtClean="0"/>
-              <a:t>Level 1 (Participant Level</a:t>
-            </a:r>
-            <a:r>
-              <a:rPr lang="en-US" u="sng" dirty="0" smtClean="0"/>
-              <a:t>):</a:t>
+              <a:t>Level 1 (Participant Level):</a:t>
             </a:r>
             <a:endParaRPr lang="en-US" u="sng" dirty="0"/>
           </a:p>
         </p:txBody>
       </p:sp>
-      <mc:AlternateContent xmlns:mc="http://schemas.openxmlformats.org/markup-compatibility/2006">
-        <mc:Choice xmlns:a14="http://schemas.microsoft.com/office/drawing/2010/main" Requires="a14">
+      <mc:AlternateContent xmlns:mc="http://schemas.openxmlformats.org/markup-compatibility/2006" xmlns:a14="http://schemas.microsoft.com/office/drawing/2010/main">
+        <mc:Choice Requires="a14">
           <p:sp>
             <p:nvSpPr>
               <p:cNvPr id="35" name="TextBox 34"/>
@@ -12341,7 +12369,7 @@
             </p:txBody>
           </p:sp>
         </mc:Choice>
-        <mc:Fallback>
+        <mc:Fallback xmlns="">
           <p:sp>
             <p:nvSpPr>
               <p:cNvPr id="35" name="TextBox 34"/>
@@ -12404,26 +12432,14 @@
           <a:p>
             <a:r>
               <a:rPr lang="en-US" u="sng" dirty="0" smtClean="0"/>
-              <a:t>Level </a:t>
-            </a:r>
-            <a:r>
-              <a:rPr lang="en-US" u="sng" dirty="0" smtClean="0"/>
-              <a:t>2 (</a:t>
-            </a:r>
-            <a:r>
-              <a:rPr lang="en-US" u="sng" dirty="0" smtClean="0"/>
-              <a:t>Group Level</a:t>
-            </a:r>
-            <a:r>
-              <a:rPr lang="en-US" u="sng" dirty="0" smtClean="0"/>
-              <a:t>):</a:t>
+              <a:t>Level 2 (Group Level):</a:t>
             </a:r>
             <a:endParaRPr lang="en-US" u="sng" dirty="0"/>
           </a:p>
         </p:txBody>
       </p:sp>
-      <mc:AlternateContent xmlns:mc="http://schemas.openxmlformats.org/markup-compatibility/2006">
-        <mc:Choice xmlns:a14="http://schemas.microsoft.com/office/drawing/2010/main" Requires="a14">
+      <mc:AlternateContent xmlns:mc="http://schemas.openxmlformats.org/markup-compatibility/2006" xmlns:a14="http://schemas.microsoft.com/office/drawing/2010/main">
+        <mc:Choice Requires="a14">
           <p:sp>
             <p:nvSpPr>
               <p:cNvPr id="37" name="TextBox 36"/>
@@ -12593,7 +12609,7 @@
             </p:txBody>
           </p:sp>
         </mc:Choice>
-        <mc:Fallback>
+        <mc:Fallback xmlns="">
           <p:sp>
             <p:nvSpPr>
               <p:cNvPr id="37" name="TextBox 36"/>
@@ -12918,8 +12934,8 @@
           </a:fontRef>
         </p:style>
       </p:cxnSp>
-      <mc:AlternateContent xmlns:mc="http://schemas.openxmlformats.org/markup-compatibility/2006">
-        <mc:Choice xmlns:a14="http://schemas.microsoft.com/office/drawing/2010/main" Requires="a14">
+      <mc:AlternateContent xmlns:mc="http://schemas.openxmlformats.org/markup-compatibility/2006" xmlns:a14="http://schemas.microsoft.com/office/drawing/2010/main">
+        <mc:Choice Requires="a14">
           <p:sp>
             <p:nvSpPr>
               <p:cNvPr id="16" name="TextBox 15"/>
@@ -13130,7 +13146,7 @@
             </p:txBody>
           </p:sp>
         </mc:Choice>
-        <mc:Fallback>
+        <mc:Fallback xmlns="">
           <p:sp>
             <p:nvSpPr>
               <p:cNvPr id="16" name="TextBox 15"/>
@@ -13169,8 +13185,8 @@
           </p:sp>
         </mc:Fallback>
       </mc:AlternateContent>
-      <mc:AlternateContent xmlns:mc="http://schemas.openxmlformats.org/markup-compatibility/2006">
-        <mc:Choice xmlns:a14="http://schemas.microsoft.com/office/drawing/2010/main" Requires="a14">
+      <mc:AlternateContent xmlns:mc="http://schemas.openxmlformats.org/markup-compatibility/2006" xmlns:a14="http://schemas.microsoft.com/office/drawing/2010/main">
+        <mc:Choice Requires="a14">
           <p:sp>
             <p:nvSpPr>
               <p:cNvPr id="18" name="TextBox 17"/>
@@ -13317,7 +13333,7 @@
             </p:txBody>
           </p:sp>
         </mc:Choice>
-        <mc:Fallback>
+        <mc:Fallback xmlns="">
           <p:sp>
             <p:nvSpPr>
               <p:cNvPr id="18" name="TextBox 17"/>
@@ -13356,8 +13372,8 @@
           </p:sp>
         </mc:Fallback>
       </mc:AlternateContent>
-      <mc:AlternateContent xmlns:mc="http://schemas.openxmlformats.org/markup-compatibility/2006">
-        <mc:Choice xmlns:a14="http://schemas.microsoft.com/office/drawing/2010/main" Requires="a14">
+      <mc:AlternateContent xmlns:mc="http://schemas.openxmlformats.org/markup-compatibility/2006" xmlns:a14="http://schemas.microsoft.com/office/drawing/2010/main">
+        <mc:Choice Requires="a14">
           <p:sp>
             <p:nvSpPr>
               <p:cNvPr id="20" name="TextBox 19"/>
@@ -13504,7 +13520,7 @@
             </p:txBody>
           </p:sp>
         </mc:Choice>
-        <mc:Fallback>
+        <mc:Fallback xmlns="">
           <p:sp>
             <p:nvSpPr>
               <p:cNvPr id="20" name="TextBox 19"/>
@@ -13567,11 +13583,7 @@
           <a:p>
             <a:r>
               <a:rPr lang="en-US" u="sng" dirty="0" smtClean="0"/>
-              <a:t>Level 1 (Participant Level</a:t>
-            </a:r>
-            <a:r>
-              <a:rPr lang="en-US" u="sng" dirty="0" smtClean="0"/>
-              <a:t>):</a:t>
+              <a:t>Level 1 (Participant Level):</a:t>
             </a:r>
             <a:endParaRPr lang="en-US" u="sng" dirty="0"/>
           </a:p>
@@ -13601,26 +13613,14 @@
           <a:p>
             <a:r>
               <a:rPr lang="en-US" u="sng" dirty="0" smtClean="0"/>
-              <a:t>Level </a:t>
-            </a:r>
-            <a:r>
-              <a:rPr lang="en-US" u="sng" dirty="0" smtClean="0"/>
-              <a:t>2 (</a:t>
-            </a:r>
-            <a:r>
-              <a:rPr lang="en-US" u="sng" dirty="0" smtClean="0"/>
-              <a:t>Group Level</a:t>
-            </a:r>
-            <a:r>
-              <a:rPr lang="en-US" u="sng" dirty="0" smtClean="0"/>
-              <a:t>):</a:t>
+              <a:t>Level 2 (Group Level):</a:t>
             </a:r>
             <a:endParaRPr lang="en-US" u="sng" dirty="0"/>
           </a:p>
         </p:txBody>
       </p:sp>
-      <mc:AlternateContent xmlns:mc="http://schemas.openxmlformats.org/markup-compatibility/2006">
-        <mc:Choice xmlns:a14="http://schemas.microsoft.com/office/drawing/2010/main" Requires="a14">
+      <mc:AlternateContent xmlns:mc="http://schemas.openxmlformats.org/markup-compatibility/2006" xmlns:a14="http://schemas.microsoft.com/office/drawing/2010/main">
+        <mc:Choice Requires="a14">
           <p:sp>
             <p:nvSpPr>
               <p:cNvPr id="25" name="TextBox 24"/>
@@ -13790,7 +13790,7 @@
             </p:txBody>
           </p:sp>
         </mc:Choice>
-        <mc:Fallback>
+        <mc:Fallback xmlns="">
           <p:sp>
             <p:nvSpPr>
               <p:cNvPr id="25" name="TextBox 24"/>

</xml_diff>